<commit_message>
fig 1 and supp
</commit_message>
<xml_diff>
--- a/manuscript/Revised/Final_Figure/Fig9_new.pptx
+++ b/manuscript/Revised/Final_Figure/Fig9_new.pptx
@@ -197,7 +197,7 @@
           <a:p>
             <a:fld id="{7384DCB3-15F9-4D74-B850-4C5894CDF6AA}" type="datetimeFigureOut">
               <a:rPr lang="fi-FI" smtClean="0"/>
-              <a:t>15.10.2024</a:t>
+              <a:t>16.10.2024</a:t>
             </a:fld>
             <a:endParaRPr lang="fi-FI"/>
           </a:p>
@@ -685,7 +685,7 @@
           <a:p>
             <a:fld id="{0C1570F5-9FB1-4A3B-864E-33D212171B2E}" type="datetimeFigureOut">
               <a:rPr lang="fi-FI" smtClean="0"/>
-              <a:t>15.10.2024</a:t>
+              <a:t>16.10.2024</a:t>
             </a:fld>
             <a:endParaRPr lang="fi-FI"/>
           </a:p>
@@ -855,7 +855,7 @@
           <a:p>
             <a:fld id="{0C1570F5-9FB1-4A3B-864E-33D212171B2E}" type="datetimeFigureOut">
               <a:rPr lang="fi-FI" smtClean="0"/>
-              <a:t>15.10.2024</a:t>
+              <a:t>16.10.2024</a:t>
             </a:fld>
             <a:endParaRPr lang="fi-FI"/>
           </a:p>
@@ -1035,7 +1035,7 @@
           <a:p>
             <a:fld id="{0C1570F5-9FB1-4A3B-864E-33D212171B2E}" type="datetimeFigureOut">
               <a:rPr lang="fi-FI" smtClean="0"/>
-              <a:t>15.10.2024</a:t>
+              <a:t>16.10.2024</a:t>
             </a:fld>
             <a:endParaRPr lang="fi-FI"/>
           </a:p>
@@ -1393,7 +1393,7 @@
           <a:p>
             <a:fld id="{0C1570F5-9FB1-4A3B-864E-33D212171B2E}" type="datetimeFigureOut">
               <a:rPr lang="fi-FI" smtClean="0"/>
-              <a:t>15.10.2024</a:t>
+              <a:t>16.10.2024</a:t>
             </a:fld>
             <a:endParaRPr lang="fi-FI"/>
           </a:p>
@@ -1639,7 +1639,7 @@
           <a:p>
             <a:fld id="{0C1570F5-9FB1-4A3B-864E-33D212171B2E}" type="datetimeFigureOut">
               <a:rPr lang="fi-FI" smtClean="0"/>
-              <a:t>15.10.2024</a:t>
+              <a:t>16.10.2024</a:t>
             </a:fld>
             <a:endParaRPr lang="fi-FI"/>
           </a:p>
@@ -1871,7 +1871,7 @@
           <a:p>
             <a:fld id="{0C1570F5-9FB1-4A3B-864E-33D212171B2E}" type="datetimeFigureOut">
               <a:rPr lang="fi-FI" smtClean="0"/>
-              <a:t>15.10.2024</a:t>
+              <a:t>16.10.2024</a:t>
             </a:fld>
             <a:endParaRPr lang="fi-FI"/>
           </a:p>
@@ -2238,7 +2238,7 @@
           <a:p>
             <a:fld id="{0C1570F5-9FB1-4A3B-864E-33D212171B2E}" type="datetimeFigureOut">
               <a:rPr lang="fi-FI" smtClean="0"/>
-              <a:t>15.10.2024</a:t>
+              <a:t>16.10.2024</a:t>
             </a:fld>
             <a:endParaRPr lang="fi-FI"/>
           </a:p>
@@ -2356,7 +2356,7 @@
           <a:p>
             <a:fld id="{0C1570F5-9FB1-4A3B-864E-33D212171B2E}" type="datetimeFigureOut">
               <a:rPr lang="fi-FI" smtClean="0"/>
-              <a:t>15.10.2024</a:t>
+              <a:t>16.10.2024</a:t>
             </a:fld>
             <a:endParaRPr lang="fi-FI"/>
           </a:p>
@@ -2451,7 +2451,7 @@
           <a:p>
             <a:fld id="{0C1570F5-9FB1-4A3B-864E-33D212171B2E}" type="datetimeFigureOut">
               <a:rPr lang="fi-FI" smtClean="0"/>
-              <a:t>15.10.2024</a:t>
+              <a:t>16.10.2024</a:t>
             </a:fld>
             <a:endParaRPr lang="fi-FI"/>
           </a:p>
@@ -2728,7 +2728,7 @@
           <a:p>
             <a:fld id="{0C1570F5-9FB1-4A3B-864E-33D212171B2E}" type="datetimeFigureOut">
               <a:rPr lang="fi-FI" smtClean="0"/>
-              <a:t>15.10.2024</a:t>
+              <a:t>16.10.2024</a:t>
             </a:fld>
             <a:endParaRPr lang="fi-FI"/>
           </a:p>
@@ -2981,7 +2981,7 @@
           <a:p>
             <a:fld id="{0C1570F5-9FB1-4A3B-864E-33D212171B2E}" type="datetimeFigureOut">
               <a:rPr lang="fi-FI" smtClean="0"/>
-              <a:t>15.10.2024</a:t>
+              <a:t>16.10.2024</a:t>
             </a:fld>
             <a:endParaRPr lang="fi-FI"/>
           </a:p>
@@ -3194,7 +3194,7 @@
           <a:p>
             <a:fld id="{0C1570F5-9FB1-4A3B-864E-33D212171B2E}" type="datetimeFigureOut">
               <a:rPr lang="fi-FI" smtClean="0"/>
-              <a:t>15.10.2024</a:t>
+              <a:t>16.10.2024</a:t>
             </a:fld>
             <a:endParaRPr lang="fi-FI"/>
           </a:p>
@@ -6428,6 +6428,147 @@
           </a:prstGeom>
         </p:spPr>
       </p:pic>
+      <p:sp>
+        <p:nvSpPr>
+          <p:cNvPr id="97" name="Oval 96"/>
+          <p:cNvSpPr/>
+          <p:nvPr/>
+        </p:nvSpPr>
+        <p:spPr>
+          <a:xfrm>
+            <a:off x="7944649" y="1866782"/>
+            <a:ext cx="737905" cy="298450"/>
+          </a:xfrm>
+          <a:prstGeom prst="ellipse">
+            <a:avLst/>
+          </a:prstGeom>
+          <a:noFill/>
+          <a:ln w="19050">
+            <a:solidFill>
+              <a:srgbClr val="FF9900"/>
+            </a:solidFill>
+            <a:prstDash val="solid"/>
+          </a:ln>
+        </p:spPr>
+        <p:style>
+          <a:lnRef idx="2">
+            <a:schemeClr val="accent1">
+              <a:shade val="50000"/>
+            </a:schemeClr>
+          </a:lnRef>
+          <a:fillRef idx="1">
+            <a:schemeClr val="accent1"/>
+          </a:fillRef>
+          <a:effectRef idx="0">
+            <a:schemeClr val="accent1"/>
+          </a:effectRef>
+          <a:fontRef idx="minor">
+            <a:schemeClr val="lt1"/>
+          </a:fontRef>
+        </p:style>
+        <p:txBody>
+          <a:bodyPr rtlCol="0" anchor="ctr"/>
+          <a:lstStyle/>
+          <a:p>
+            <a:pPr algn="ctr"/>
+            <a:endParaRPr lang="fi-FI"/>
+          </a:p>
+        </p:txBody>
+      </p:sp>
+      <p:sp>
+        <p:nvSpPr>
+          <p:cNvPr id="109" name="Oval 108"/>
+          <p:cNvSpPr/>
+          <p:nvPr/>
+        </p:nvSpPr>
+        <p:spPr>
+          <a:xfrm>
+            <a:off x="4419576" y="3970884"/>
+            <a:ext cx="737905" cy="298450"/>
+          </a:xfrm>
+          <a:prstGeom prst="ellipse">
+            <a:avLst/>
+          </a:prstGeom>
+          <a:noFill/>
+          <a:ln w="19050">
+            <a:solidFill>
+              <a:srgbClr val="FF9900"/>
+            </a:solidFill>
+            <a:prstDash val="solid"/>
+          </a:ln>
+        </p:spPr>
+        <p:style>
+          <a:lnRef idx="2">
+            <a:schemeClr val="accent1">
+              <a:shade val="50000"/>
+            </a:schemeClr>
+          </a:lnRef>
+          <a:fillRef idx="1">
+            <a:schemeClr val="accent1"/>
+          </a:fillRef>
+          <a:effectRef idx="0">
+            <a:schemeClr val="accent1"/>
+          </a:effectRef>
+          <a:fontRef idx="minor">
+            <a:schemeClr val="lt1"/>
+          </a:fontRef>
+        </p:style>
+        <p:txBody>
+          <a:bodyPr rtlCol="0" anchor="ctr"/>
+          <a:lstStyle/>
+          <a:p>
+            <a:pPr algn="ctr"/>
+            <a:endParaRPr lang="fi-FI"/>
+          </a:p>
+        </p:txBody>
+      </p:sp>
+      <p:sp>
+        <p:nvSpPr>
+          <p:cNvPr id="110" name="Oval 109"/>
+          <p:cNvSpPr/>
+          <p:nvPr/>
+        </p:nvSpPr>
+        <p:spPr>
+          <a:xfrm>
+            <a:off x="8160335" y="3970884"/>
+            <a:ext cx="1503019" cy="298450"/>
+          </a:xfrm>
+          <a:prstGeom prst="ellipse">
+            <a:avLst/>
+          </a:prstGeom>
+          <a:noFill/>
+          <a:ln w="19050">
+            <a:solidFill>
+              <a:srgbClr val="FF9900"/>
+            </a:solidFill>
+            <a:prstDash val="solid"/>
+          </a:ln>
+        </p:spPr>
+        <p:style>
+          <a:lnRef idx="2">
+            <a:schemeClr val="accent1">
+              <a:shade val="50000"/>
+            </a:schemeClr>
+          </a:lnRef>
+          <a:fillRef idx="1">
+            <a:schemeClr val="accent1"/>
+          </a:fillRef>
+          <a:effectRef idx="0">
+            <a:schemeClr val="accent1"/>
+          </a:effectRef>
+          <a:fontRef idx="minor">
+            <a:schemeClr val="lt1"/>
+          </a:fontRef>
+        </p:style>
+        <p:txBody>
+          <a:bodyPr rtlCol="0" anchor="ctr"/>
+          <a:lstStyle/>
+          <a:p>
+            <a:pPr algn="ctr"/>
+            <a:endParaRPr lang="fi-FI"/>
+          </a:p>
+        </p:txBody>
+      </p:sp>
     </p:spTree>
     <p:extLst>
       <p:ext uri="{BB962C8B-B14F-4D97-AF65-F5344CB8AC3E}">

</xml_diff>